<commit_message>
add adf based loss
</commit_message>
<xml_diff>
--- a/Summary_flow.pptx
+++ b/Summary_flow.pptx
@@ -6,6 +6,7 @@
   </p:sldMasterIdLst>
   <p:sldIdLst>
     <p:sldId id="256" r:id="rId2"/>
+    <p:sldId id="257" r:id="rId3"/>
   </p:sldIdLst>
   <p:sldSz cx="12192000" cy="6858000"/>
   <p:notesSz cx="6858000" cy="9144000"/>
@@ -3708,6 +3709,195 @@
 </p:sld>
 </file>
 
+<file path=ppt/slides/slide2.xml><?xml version="1.0" encoding="utf-8"?>
+<p:sld xmlns:a="http://schemas.openxmlformats.org/drawingml/2006/main" xmlns:r="http://schemas.openxmlformats.org/officeDocument/2006/relationships" xmlns:p="http://schemas.openxmlformats.org/presentationml/2006/main">
+  <p:cSld>
+    <p:spTree>
+      <p:nvGrpSpPr>
+        <p:cNvPr id="1" name=""/>
+        <p:cNvGrpSpPr/>
+        <p:nvPr/>
+      </p:nvGrpSpPr>
+      <p:grpSpPr>
+        <a:xfrm>
+          <a:off x="0" y="0"/>
+          <a:ext cx="0" cy="0"/>
+          <a:chOff x="0" y="0"/>
+          <a:chExt cx="0" cy="0"/>
+        </a:xfrm>
+      </p:grpSpPr>
+      <p:sp>
+        <p:nvSpPr>
+          <p:cNvPr id="4" name="TextBox 3">
+            <a:extLst>
+              <a:ext uri="{FF2B5EF4-FFF2-40B4-BE49-F238E27FC236}">
+                <a16:creationId xmlns:a16="http://schemas.microsoft.com/office/drawing/2014/main" id="{5625187C-8B24-65B0-EF99-15A3F18432F6}"/>
+              </a:ext>
+            </a:extLst>
+          </p:cNvPr>
+          <p:cNvSpPr txBox="1"/>
+          <p:nvPr/>
+        </p:nvSpPr>
+        <p:spPr>
+          <a:xfrm>
+            <a:off x="2491616" y="387927"/>
+            <a:ext cx="7208768" cy="369332"/>
+          </a:xfrm>
+          <a:prstGeom prst="rect">
+            <a:avLst/>
+          </a:prstGeom>
+          <a:noFill/>
+        </p:spPr>
+        <p:txBody>
+          <a:bodyPr wrap="none" rtlCol="0">
+            <a:spAutoFit/>
+          </a:bodyPr>
+          <a:lstStyle/>
+          <a:p>
+            <a:r>
+              <a:rPr lang="en-US" dirty="0"/>
+              <a:t>Once disorder is identified we can use ADF for Phase identification loss</a:t>
+            </a:r>
+          </a:p>
+        </p:txBody>
+      </p:sp>
+      <p:pic>
+        <p:nvPicPr>
+          <p:cNvPr id="6" name="Picture 5" descr="A graph with colorful lines and text&#10;&#10;AI-generated content may be incorrect.">
+            <a:extLst>
+              <a:ext uri="{FF2B5EF4-FFF2-40B4-BE49-F238E27FC236}">
+                <a16:creationId xmlns:a16="http://schemas.microsoft.com/office/drawing/2014/main" id="{5A2DAAEB-B90D-9644-8850-76AF0AD80562}"/>
+              </a:ext>
+            </a:extLst>
+          </p:cNvPr>
+          <p:cNvPicPr>
+            <a:picLocks noChangeAspect="1"/>
+          </p:cNvPicPr>
+          <p:nvPr/>
+        </p:nvPicPr>
+        <p:blipFill>
+          <a:blip r:embed="rId2"/>
+          <a:stretch>
+            <a:fillRect/>
+          </a:stretch>
+        </p:blipFill>
+        <p:spPr>
+          <a:xfrm>
+            <a:off x="3565115" y="2609754"/>
+            <a:ext cx="6439655" cy="3897685"/>
+          </a:xfrm>
+          <a:prstGeom prst="rect">
+            <a:avLst/>
+          </a:prstGeom>
+        </p:spPr>
+      </p:pic>
+      <p:pic>
+        <p:nvPicPr>
+          <p:cNvPr id="8" name="Picture 7" descr="A math problem with black text&#10;&#10;AI-generated content may be incorrect.">
+            <a:extLst>
+              <a:ext uri="{FF2B5EF4-FFF2-40B4-BE49-F238E27FC236}">
+                <a16:creationId xmlns:a16="http://schemas.microsoft.com/office/drawing/2014/main" id="{965899EB-E8BC-ED66-6BCE-C6AEADB24B74}"/>
+              </a:ext>
+            </a:extLst>
+          </p:cNvPr>
+          <p:cNvPicPr>
+            <a:picLocks noChangeAspect="1"/>
+          </p:cNvPicPr>
+          <p:nvPr/>
+        </p:nvPicPr>
+        <p:blipFill>
+          <a:blip r:embed="rId3"/>
+          <a:srcRect l="51585" t="23936"/>
+          <a:stretch/>
+        </p:blipFill>
+        <p:spPr>
+          <a:xfrm>
+            <a:off x="350253" y="1431216"/>
+            <a:ext cx="3037440" cy="1033637"/>
+          </a:xfrm>
+          <a:prstGeom prst="rect">
+            <a:avLst/>
+          </a:prstGeom>
+        </p:spPr>
+      </p:pic>
+      <p:sp>
+        <p:nvSpPr>
+          <p:cNvPr id="9" name="TextBox 8">
+            <a:extLst>
+              <a:ext uri="{FF2B5EF4-FFF2-40B4-BE49-F238E27FC236}">
+                <a16:creationId xmlns:a16="http://schemas.microsoft.com/office/drawing/2014/main" id="{E79D91B4-3B36-38C0-240C-C42069AED37D}"/>
+              </a:ext>
+            </a:extLst>
+          </p:cNvPr>
+          <p:cNvSpPr txBox="1"/>
+          <p:nvPr/>
+        </p:nvSpPr>
+        <p:spPr>
+          <a:xfrm>
+            <a:off x="1039804" y="1002267"/>
+            <a:ext cx="1658339" cy="369332"/>
+          </a:xfrm>
+          <a:prstGeom prst="rect">
+            <a:avLst/>
+          </a:prstGeom>
+          <a:noFill/>
+        </p:spPr>
+        <p:txBody>
+          <a:bodyPr wrap="none" rtlCol="0">
+            <a:spAutoFit/>
+          </a:bodyPr>
+          <a:lstStyle/>
+          <a:p>
+            <a:r>
+              <a:rPr lang="en-US" dirty="0"/>
+              <a:t>Hellinger Loss:</a:t>
+            </a:r>
+          </a:p>
+        </p:txBody>
+      </p:sp>
+      <p:pic>
+        <p:nvPicPr>
+          <p:cNvPr id="12" name="Picture 11" descr="A screen shot of a computer&#10;&#10;AI-generated content may be incorrect.">
+            <a:extLst>
+              <a:ext uri="{FF2B5EF4-FFF2-40B4-BE49-F238E27FC236}">
+                <a16:creationId xmlns:a16="http://schemas.microsoft.com/office/drawing/2014/main" id="{CD56389C-4584-8A33-51C4-A28E60AB4DE9}"/>
+              </a:ext>
+            </a:extLst>
+          </p:cNvPr>
+          <p:cNvPicPr>
+            <a:picLocks noChangeAspect="1"/>
+          </p:cNvPicPr>
+          <p:nvPr/>
+        </p:nvPicPr>
+        <p:blipFill>
+          <a:blip r:embed="rId4"/>
+          <a:stretch>
+            <a:fillRect/>
+          </a:stretch>
+        </p:blipFill>
+        <p:spPr>
+          <a:xfrm>
+            <a:off x="3387693" y="1353370"/>
+            <a:ext cx="6794500" cy="1155700"/>
+          </a:xfrm>
+          <a:prstGeom prst="rect">
+            <a:avLst/>
+          </a:prstGeom>
+        </p:spPr>
+      </p:pic>
+    </p:spTree>
+    <p:extLst>
+      <p:ext uri="{BB962C8B-B14F-4D97-AF65-F5344CB8AC3E}">
+        <p14:creationId xmlns:p14="http://schemas.microsoft.com/office/powerpoint/2010/main" val="4218541936"/>
+      </p:ext>
+    </p:extLst>
+  </p:cSld>
+  <p:clrMapOvr>
+    <a:masterClrMapping/>
+  </p:clrMapOvr>
+</p:sld>
+</file>
+
 <file path=ppt/theme/theme1.xml><?xml version="1.0" encoding="utf-8"?>
 <a:theme xmlns:a="http://schemas.openxmlformats.org/drawingml/2006/main" name="Office Theme">
   <a:themeElements>

</xml_diff>